<commit_message>
QUIC coverage in TLS
</commit_message>
<xml_diff>
--- a/figures/SecurityFigs.pptx
+++ b/figures/SecurityFigs.pptx
@@ -5,11 +5,12 @@
     <p:sldMasterId id="2147483648" r:id="rId1"/>
   </p:sldMasterIdLst>
   <p:notesMasterIdLst>
-    <p:notesMasterId r:id="rId4"/>
+    <p:notesMasterId r:id="rId5"/>
   </p:notesMasterIdLst>
   <p:sldIdLst>
     <p:sldId id="262" r:id="rId2"/>
     <p:sldId id="263" r:id="rId3"/>
+    <p:sldId id="264" r:id="rId4"/>
   </p:sldIdLst>
   <p:sldSz cx="12192000" cy="6858000"/>
   <p:notesSz cx="6858000" cy="9144000"/>
@@ -110,7 +111,18 @@
   </p:defaultTextStyle>
   <p:extLst>
     <p:ext uri="{EFAFB233-063F-42B5-8137-9DF3F51BA10A}">
-      <p15:sldGuideLst xmlns:p15="http://schemas.microsoft.com/office/powerpoint/2012/main"/>
+      <p15:sldGuideLst xmlns:p15="http://schemas.microsoft.com/office/powerpoint/2012/main">
+        <p15:guide id="1" orient="horz" pos="2160" userDrawn="1">
+          <p15:clr>
+            <a:srgbClr val="A4A3A4"/>
+          </p15:clr>
+        </p15:guide>
+        <p15:guide id="2" pos="3840" userDrawn="1">
+          <p15:clr>
+            <a:srgbClr val="A4A3A4"/>
+          </p15:clr>
+        </p15:guide>
+      </p15:sldGuideLst>
     </p:ext>
   </p:extLst>
 </p:presentation>
@@ -198,7 +210,7 @@
           <a:p>
             <a:fld id="{2863C8FA-B8BC-9144-A506-E432740B92D8}" type="datetimeFigureOut">
               <a:rPr lang="en-US" smtClean="0"/>
-              <a:t>10/3/24</a:t>
+              <a:t>11/25/24</a:t>
             </a:fld>
             <a:endParaRPr lang="en-US"/>
           </a:p>
@@ -594,7 +606,7 @@
           <a:p>
             <a:fld id="{5D97E163-DB95-D24D-8C95-263DECB1FC34}" type="datetimeFigureOut">
               <a:rPr lang="en-US" smtClean="0"/>
-              <a:t>10/3/24</a:t>
+              <a:t>11/25/24</a:t>
             </a:fld>
             <a:endParaRPr lang="en-US"/>
           </a:p>
@@ -762,7 +774,7 @@
           <a:p>
             <a:fld id="{5D97E163-DB95-D24D-8C95-263DECB1FC34}" type="datetimeFigureOut">
               <a:rPr lang="en-US" smtClean="0"/>
-              <a:t>10/3/24</a:t>
+              <a:t>11/25/24</a:t>
             </a:fld>
             <a:endParaRPr lang="en-US"/>
           </a:p>
@@ -940,7 +952,7 @@
           <a:p>
             <a:fld id="{5D97E163-DB95-D24D-8C95-263DECB1FC34}" type="datetimeFigureOut">
               <a:rPr lang="en-US" smtClean="0"/>
-              <a:t>10/3/24</a:t>
+              <a:t>11/25/24</a:t>
             </a:fld>
             <a:endParaRPr lang="en-US"/>
           </a:p>
@@ -1108,7 +1120,7 @@
           <a:p>
             <a:fld id="{5D97E163-DB95-D24D-8C95-263DECB1FC34}" type="datetimeFigureOut">
               <a:rPr lang="en-US" smtClean="0"/>
-              <a:t>10/3/24</a:t>
+              <a:t>11/25/24</a:t>
             </a:fld>
             <a:endParaRPr lang="en-US"/>
           </a:p>
@@ -1353,7 +1365,7 @@
           <a:p>
             <a:fld id="{5D97E163-DB95-D24D-8C95-263DECB1FC34}" type="datetimeFigureOut">
               <a:rPr lang="en-US" smtClean="0"/>
-              <a:t>10/3/24</a:t>
+              <a:t>11/25/24</a:t>
             </a:fld>
             <a:endParaRPr lang="en-US"/>
           </a:p>
@@ -1582,7 +1594,7 @@
           <a:p>
             <a:fld id="{5D97E163-DB95-D24D-8C95-263DECB1FC34}" type="datetimeFigureOut">
               <a:rPr lang="en-US" smtClean="0"/>
-              <a:t>10/3/24</a:t>
+              <a:t>11/25/24</a:t>
             </a:fld>
             <a:endParaRPr lang="en-US"/>
           </a:p>
@@ -1946,7 +1958,7 @@
           <a:p>
             <a:fld id="{5D97E163-DB95-D24D-8C95-263DECB1FC34}" type="datetimeFigureOut">
               <a:rPr lang="en-US" smtClean="0"/>
-              <a:t>10/3/24</a:t>
+              <a:t>11/25/24</a:t>
             </a:fld>
             <a:endParaRPr lang="en-US"/>
           </a:p>
@@ -2063,7 +2075,7 @@
           <a:p>
             <a:fld id="{5D97E163-DB95-D24D-8C95-263DECB1FC34}" type="datetimeFigureOut">
               <a:rPr lang="en-US" smtClean="0"/>
-              <a:t>10/3/24</a:t>
+              <a:t>11/25/24</a:t>
             </a:fld>
             <a:endParaRPr lang="en-US"/>
           </a:p>
@@ -2158,7 +2170,7 @@
           <a:p>
             <a:fld id="{5D97E163-DB95-D24D-8C95-263DECB1FC34}" type="datetimeFigureOut">
               <a:rPr lang="en-US" smtClean="0"/>
-              <a:t>10/3/24</a:t>
+              <a:t>11/25/24</a:t>
             </a:fld>
             <a:endParaRPr lang="en-US"/>
           </a:p>
@@ -2433,7 +2445,7 @@
           <a:p>
             <a:fld id="{5D97E163-DB95-D24D-8C95-263DECB1FC34}" type="datetimeFigureOut">
               <a:rPr lang="en-US" smtClean="0"/>
-              <a:t>10/3/24</a:t>
+              <a:t>11/25/24</a:t>
             </a:fld>
             <a:endParaRPr lang="en-US"/>
           </a:p>
@@ -2685,7 +2697,7 @@
           <a:p>
             <a:fld id="{5D97E163-DB95-D24D-8C95-263DECB1FC34}" type="datetimeFigureOut">
               <a:rPr lang="en-US" smtClean="0"/>
-              <a:t>10/3/24</a:t>
+              <a:t>11/25/24</a:t>
             </a:fld>
             <a:endParaRPr lang="en-US"/>
           </a:p>
@@ -2896,7 +2908,7 @@
           <a:p>
             <a:fld id="{5D97E163-DB95-D24D-8C95-263DECB1FC34}" type="datetimeFigureOut">
               <a:rPr lang="en-US" smtClean="0"/>
-              <a:t>10/3/24</a:t>
+              <a:t>11/25/24</a:t>
             </a:fld>
             <a:endParaRPr lang="en-US"/>
           </a:p>
@@ -6816,6 +6828,1062 @@
     <p:extLst>
       <p:ext uri="{BB962C8B-B14F-4D97-AF65-F5344CB8AC3E}">
         <p14:creationId xmlns:p14="http://schemas.microsoft.com/office/powerpoint/2010/main" val="98961708"/>
+      </p:ext>
+    </p:extLst>
+  </p:cSld>
+  <p:clrMapOvr>
+    <a:masterClrMapping/>
+  </p:clrMapOvr>
+</p:sld>
+</file>
+
+<file path=ppt/slides/slide3.xml><?xml version="1.0" encoding="utf-8"?>
+<p:sld xmlns:a="http://schemas.openxmlformats.org/drawingml/2006/main" xmlns:r="http://schemas.openxmlformats.org/officeDocument/2006/relationships" xmlns:p="http://schemas.openxmlformats.org/presentationml/2006/main">
+  <p:cSld>
+    <p:spTree>
+      <p:nvGrpSpPr>
+        <p:cNvPr id="1" name=""/>
+        <p:cNvGrpSpPr/>
+        <p:nvPr/>
+      </p:nvGrpSpPr>
+      <p:grpSpPr>
+        <a:xfrm>
+          <a:off x="0" y="0"/>
+          <a:ext cx="0" cy="0"/>
+          <a:chOff x="0" y="0"/>
+          <a:chExt cx="0" cy="0"/>
+        </a:xfrm>
+      </p:grpSpPr>
+      <p:grpSp>
+        <p:nvGrpSpPr>
+          <p:cNvPr id="4" name="Group 3">
+            <a:extLst>
+              <a:ext uri="{FF2B5EF4-FFF2-40B4-BE49-F238E27FC236}">
+                <a16:creationId xmlns:a16="http://schemas.microsoft.com/office/drawing/2014/main" id="{CAEA5E32-1F69-8A40-97DB-DD68A6A31657}"/>
+              </a:ext>
+            </a:extLst>
+          </p:cNvPr>
+          <p:cNvGrpSpPr/>
+          <p:nvPr/>
+        </p:nvGrpSpPr>
+        <p:grpSpPr>
+          <a:xfrm>
+            <a:off x="1303283" y="1008993"/>
+            <a:ext cx="1807779" cy="714704"/>
+            <a:chOff x="1303283" y="1008993"/>
+            <a:chExt cx="1807779" cy="714704"/>
+          </a:xfrm>
+        </p:grpSpPr>
+        <p:sp>
+          <p:nvSpPr>
+            <p:cNvPr id="2" name="Rectangle 1">
+              <a:extLst>
+                <a:ext uri="{FF2B5EF4-FFF2-40B4-BE49-F238E27FC236}">
+                  <a16:creationId xmlns:a16="http://schemas.microsoft.com/office/drawing/2014/main" id="{D204927A-F5D5-794D-8E9F-83B45E17A8C4}"/>
+                </a:ext>
+              </a:extLst>
+            </p:cNvPr>
+            <p:cNvSpPr/>
+            <p:nvPr/>
+          </p:nvSpPr>
+          <p:spPr>
+            <a:xfrm>
+              <a:off x="1303283" y="1008993"/>
+              <a:ext cx="1807779" cy="714704"/>
+            </a:xfrm>
+            <a:prstGeom prst="rect">
+              <a:avLst/>
+            </a:prstGeom>
+            <a:noFill/>
+            <a:ln>
+              <a:solidFill>
+                <a:schemeClr val="tx1"/>
+              </a:solidFill>
+            </a:ln>
+          </p:spPr>
+          <p:style>
+            <a:lnRef idx="2">
+              <a:schemeClr val="accent1">
+                <a:shade val="50000"/>
+              </a:schemeClr>
+            </a:lnRef>
+            <a:fillRef idx="1">
+              <a:schemeClr val="accent1"/>
+            </a:fillRef>
+            <a:effectRef idx="0">
+              <a:schemeClr val="accent1"/>
+            </a:effectRef>
+            <a:fontRef idx="minor">
+              <a:schemeClr val="lt1"/>
+            </a:fontRef>
+          </p:style>
+          <p:txBody>
+            <a:bodyPr rtlCol="0" anchor="ctr"/>
+            <a:lstStyle/>
+            <a:p>
+              <a:pPr algn="ctr"/>
+              <a:endParaRPr lang="en-AU" sz="1200"/>
+            </a:p>
+          </p:txBody>
+        </p:sp>
+        <p:sp>
+          <p:nvSpPr>
+            <p:cNvPr id="3" name="TextBox 2">
+              <a:extLst>
+                <a:ext uri="{FF2B5EF4-FFF2-40B4-BE49-F238E27FC236}">
+                  <a16:creationId xmlns:a16="http://schemas.microsoft.com/office/drawing/2014/main" id="{07E836D2-DD56-E548-8410-3F31125110BC}"/>
+                </a:ext>
+              </a:extLst>
+            </p:cNvPr>
+            <p:cNvSpPr txBox="1"/>
+            <p:nvPr/>
+          </p:nvSpPr>
+          <p:spPr>
+            <a:xfrm>
+              <a:off x="1950274" y="1181679"/>
+              <a:ext cx="513795" cy="276999"/>
+            </a:xfrm>
+            <a:prstGeom prst="rect">
+              <a:avLst/>
+            </a:prstGeom>
+            <a:noFill/>
+          </p:spPr>
+          <p:txBody>
+            <a:bodyPr wrap="none" rtlCol="0">
+              <a:spAutoFit/>
+            </a:bodyPr>
+            <a:lstStyle/>
+            <a:p>
+              <a:pPr algn="ctr"/>
+              <a:r>
+                <a:rPr lang="en-AU" sz="1200" dirty="0"/>
+                <a:t>HTTP</a:t>
+              </a:r>
+            </a:p>
+          </p:txBody>
+        </p:sp>
+      </p:grpSp>
+      <p:sp>
+        <p:nvSpPr>
+          <p:cNvPr id="6" name="Rectangle 5">
+            <a:extLst>
+              <a:ext uri="{FF2B5EF4-FFF2-40B4-BE49-F238E27FC236}">
+                <a16:creationId xmlns:a16="http://schemas.microsoft.com/office/drawing/2014/main" id="{F22E4B5F-71F3-EF45-A254-7188EB5D2CC5}"/>
+              </a:ext>
+            </a:extLst>
+          </p:cNvPr>
+          <p:cNvSpPr/>
+          <p:nvPr/>
+        </p:nvSpPr>
+        <p:spPr>
+          <a:xfrm>
+            <a:off x="1292435" y="2274018"/>
+            <a:ext cx="1807779" cy="369332"/>
+          </a:xfrm>
+          <a:prstGeom prst="rect">
+            <a:avLst/>
+          </a:prstGeom>
+          <a:noFill/>
+          <a:ln>
+            <a:solidFill>
+              <a:schemeClr val="tx1"/>
+            </a:solidFill>
+          </a:ln>
+        </p:spPr>
+        <p:style>
+          <a:lnRef idx="2">
+            <a:schemeClr val="accent1">
+              <a:shade val="50000"/>
+            </a:schemeClr>
+          </a:lnRef>
+          <a:fillRef idx="1">
+            <a:schemeClr val="accent1"/>
+          </a:fillRef>
+          <a:effectRef idx="0">
+            <a:schemeClr val="accent1"/>
+          </a:effectRef>
+          <a:fontRef idx="minor">
+            <a:schemeClr val="lt1"/>
+          </a:fontRef>
+        </p:style>
+        <p:txBody>
+          <a:bodyPr rtlCol="0" anchor="ctr"/>
+          <a:lstStyle/>
+          <a:p>
+            <a:pPr algn="ctr"/>
+            <a:endParaRPr lang="en-AU" sz="1200"/>
+          </a:p>
+        </p:txBody>
+      </p:sp>
+      <p:sp>
+        <p:nvSpPr>
+          <p:cNvPr id="7" name="TextBox 6">
+            <a:extLst>
+              <a:ext uri="{FF2B5EF4-FFF2-40B4-BE49-F238E27FC236}">
+                <a16:creationId xmlns:a16="http://schemas.microsoft.com/office/drawing/2014/main" id="{B202AB4D-4BA0-C24B-A83E-4D555D556659}"/>
+              </a:ext>
+            </a:extLst>
+          </p:cNvPr>
+          <p:cNvSpPr txBox="1"/>
+          <p:nvPr/>
+        </p:nvSpPr>
+        <p:spPr>
+          <a:xfrm>
+            <a:off x="839960" y="2101332"/>
+            <a:ext cx="394660" cy="276999"/>
+          </a:xfrm>
+          <a:prstGeom prst="rect">
+            <a:avLst/>
+          </a:prstGeom>
+          <a:noFill/>
+        </p:spPr>
+        <p:txBody>
+          <a:bodyPr wrap="none" rtlCol="0">
+            <a:spAutoFit/>
+          </a:bodyPr>
+          <a:lstStyle/>
+          <a:p>
+            <a:pPr algn="ctr"/>
+            <a:r>
+              <a:rPr lang="en-AU" sz="1200" dirty="0"/>
+              <a:t>TLS</a:t>
+            </a:r>
+          </a:p>
+        </p:txBody>
+      </p:sp>
+      <p:grpSp>
+        <p:nvGrpSpPr>
+          <p:cNvPr id="8" name="Group 7">
+            <a:extLst>
+              <a:ext uri="{FF2B5EF4-FFF2-40B4-BE49-F238E27FC236}">
+                <a16:creationId xmlns:a16="http://schemas.microsoft.com/office/drawing/2014/main" id="{50D77233-9801-8842-81DA-D201F90EEF59}"/>
+              </a:ext>
+            </a:extLst>
+          </p:cNvPr>
+          <p:cNvGrpSpPr/>
+          <p:nvPr/>
+        </p:nvGrpSpPr>
+        <p:grpSpPr>
+          <a:xfrm>
+            <a:off x="1288535" y="2869320"/>
+            <a:ext cx="1807779" cy="714704"/>
+            <a:chOff x="1303283" y="1008993"/>
+            <a:chExt cx="1807779" cy="714704"/>
+          </a:xfrm>
+        </p:grpSpPr>
+        <p:sp>
+          <p:nvSpPr>
+            <p:cNvPr id="9" name="Rectangle 8">
+              <a:extLst>
+                <a:ext uri="{FF2B5EF4-FFF2-40B4-BE49-F238E27FC236}">
+                  <a16:creationId xmlns:a16="http://schemas.microsoft.com/office/drawing/2014/main" id="{CCAFB87C-FF5F-7E4F-B17B-2D627C996D21}"/>
+                </a:ext>
+              </a:extLst>
+            </p:cNvPr>
+            <p:cNvSpPr/>
+            <p:nvPr/>
+          </p:nvSpPr>
+          <p:spPr>
+            <a:xfrm>
+              <a:off x="1303283" y="1008993"/>
+              <a:ext cx="1807779" cy="714704"/>
+            </a:xfrm>
+            <a:prstGeom prst="rect">
+              <a:avLst/>
+            </a:prstGeom>
+            <a:noFill/>
+            <a:ln>
+              <a:solidFill>
+                <a:schemeClr val="tx1"/>
+              </a:solidFill>
+            </a:ln>
+          </p:spPr>
+          <p:style>
+            <a:lnRef idx="2">
+              <a:schemeClr val="accent1">
+                <a:shade val="50000"/>
+              </a:schemeClr>
+            </a:lnRef>
+            <a:fillRef idx="1">
+              <a:schemeClr val="accent1"/>
+            </a:fillRef>
+            <a:effectRef idx="0">
+              <a:schemeClr val="accent1"/>
+            </a:effectRef>
+            <a:fontRef idx="minor">
+              <a:schemeClr val="lt1"/>
+            </a:fontRef>
+          </p:style>
+          <p:txBody>
+            <a:bodyPr rtlCol="0" anchor="ctr"/>
+            <a:lstStyle/>
+            <a:p>
+              <a:pPr algn="ctr"/>
+              <a:endParaRPr lang="en-AU" sz="1200"/>
+            </a:p>
+          </p:txBody>
+        </p:sp>
+        <p:sp>
+          <p:nvSpPr>
+            <p:cNvPr id="10" name="TextBox 9">
+              <a:extLst>
+                <a:ext uri="{FF2B5EF4-FFF2-40B4-BE49-F238E27FC236}">
+                  <a16:creationId xmlns:a16="http://schemas.microsoft.com/office/drawing/2014/main" id="{898BCD93-BACA-0B47-B74D-4143B4E4ABEB}"/>
+                </a:ext>
+              </a:extLst>
+            </p:cNvPr>
+            <p:cNvSpPr txBox="1"/>
+            <p:nvPr/>
+          </p:nvSpPr>
+          <p:spPr>
+            <a:xfrm>
+              <a:off x="1997787" y="1181679"/>
+              <a:ext cx="418768" cy="276999"/>
+            </a:xfrm>
+            <a:prstGeom prst="rect">
+              <a:avLst/>
+            </a:prstGeom>
+            <a:noFill/>
+          </p:spPr>
+          <p:txBody>
+            <a:bodyPr wrap="none" rtlCol="0">
+              <a:spAutoFit/>
+            </a:bodyPr>
+            <a:lstStyle/>
+            <a:p>
+              <a:pPr algn="ctr"/>
+              <a:r>
+                <a:rPr lang="en-AU" sz="1200" dirty="0"/>
+                <a:t>TCP</a:t>
+              </a:r>
+            </a:p>
+          </p:txBody>
+        </p:sp>
+      </p:grpSp>
+      <p:sp>
+        <p:nvSpPr>
+          <p:cNvPr id="16" name="TextBox 15">
+            <a:extLst>
+              <a:ext uri="{FF2B5EF4-FFF2-40B4-BE49-F238E27FC236}">
+                <a16:creationId xmlns:a16="http://schemas.microsoft.com/office/drawing/2014/main" id="{350F3C47-356A-6646-8369-63EA63C80B79}"/>
+              </a:ext>
+            </a:extLst>
+          </p:cNvPr>
+          <p:cNvSpPr txBox="1"/>
+          <p:nvPr/>
+        </p:nvSpPr>
+        <p:spPr>
+          <a:xfrm>
+            <a:off x="1709741" y="2318262"/>
+            <a:ext cx="986552" cy="276999"/>
+          </a:xfrm>
+          <a:prstGeom prst="rect">
+            <a:avLst/>
+          </a:prstGeom>
+          <a:noFill/>
+        </p:spPr>
+        <p:txBody>
+          <a:bodyPr wrap="none" rtlCol="0">
+            <a:spAutoFit/>
+          </a:bodyPr>
+          <a:lstStyle/>
+          <a:p>
+            <a:pPr algn="ctr"/>
+            <a:r>
+              <a:rPr lang="en-AU" sz="1200" dirty="0"/>
+              <a:t>Record Layer</a:t>
+            </a:r>
+          </a:p>
+        </p:txBody>
+      </p:sp>
+      <p:sp>
+        <p:nvSpPr>
+          <p:cNvPr id="17" name="Rectangle 16">
+            <a:extLst>
+              <a:ext uri="{FF2B5EF4-FFF2-40B4-BE49-F238E27FC236}">
+                <a16:creationId xmlns:a16="http://schemas.microsoft.com/office/drawing/2014/main" id="{A96FC2A4-E1DA-3044-BCC3-5673B7E603D4}"/>
+              </a:ext>
+            </a:extLst>
+          </p:cNvPr>
+          <p:cNvSpPr/>
+          <p:nvPr/>
+        </p:nvSpPr>
+        <p:spPr>
+          <a:xfrm>
+            <a:off x="1292774" y="1904686"/>
+            <a:ext cx="1345446" cy="369332"/>
+          </a:xfrm>
+          <a:prstGeom prst="rect">
+            <a:avLst/>
+          </a:prstGeom>
+          <a:noFill/>
+          <a:ln>
+            <a:solidFill>
+              <a:schemeClr val="tx1"/>
+            </a:solidFill>
+          </a:ln>
+        </p:spPr>
+        <p:style>
+          <a:lnRef idx="2">
+            <a:schemeClr val="accent1">
+              <a:shade val="50000"/>
+            </a:schemeClr>
+          </a:lnRef>
+          <a:fillRef idx="1">
+            <a:schemeClr val="accent1"/>
+          </a:fillRef>
+          <a:effectRef idx="0">
+            <a:schemeClr val="accent1"/>
+          </a:effectRef>
+          <a:fontRef idx="minor">
+            <a:schemeClr val="lt1"/>
+          </a:fontRef>
+        </p:style>
+        <p:txBody>
+          <a:bodyPr rtlCol="0" anchor="ctr"/>
+          <a:lstStyle/>
+          <a:p>
+            <a:pPr algn="ctr"/>
+            <a:endParaRPr lang="en-AU" sz="1200"/>
+          </a:p>
+        </p:txBody>
+      </p:sp>
+      <p:sp>
+        <p:nvSpPr>
+          <p:cNvPr id="18" name="TextBox 17">
+            <a:extLst>
+              <a:ext uri="{FF2B5EF4-FFF2-40B4-BE49-F238E27FC236}">
+                <a16:creationId xmlns:a16="http://schemas.microsoft.com/office/drawing/2014/main" id="{31254DCF-6152-B24F-9FB3-37E7B2EE09DC}"/>
+              </a:ext>
+            </a:extLst>
+          </p:cNvPr>
+          <p:cNvSpPr txBox="1"/>
+          <p:nvPr/>
+        </p:nvSpPr>
+        <p:spPr>
+          <a:xfrm>
+            <a:off x="1330019" y="1946162"/>
+            <a:ext cx="1239377" cy="276999"/>
+          </a:xfrm>
+          <a:prstGeom prst="rect">
+            <a:avLst/>
+          </a:prstGeom>
+          <a:noFill/>
+        </p:spPr>
+        <p:txBody>
+          <a:bodyPr wrap="none" rtlCol="0">
+            <a:spAutoFit/>
+          </a:bodyPr>
+          <a:lstStyle/>
+          <a:p>
+            <a:pPr algn="ctr"/>
+            <a:r>
+              <a:rPr lang="en-AU" sz="1200" dirty="0"/>
+              <a:t>Handshake Layer</a:t>
+            </a:r>
+          </a:p>
+        </p:txBody>
+      </p:sp>
+      <p:grpSp>
+        <p:nvGrpSpPr>
+          <p:cNvPr id="19" name="Group 18">
+            <a:extLst>
+              <a:ext uri="{FF2B5EF4-FFF2-40B4-BE49-F238E27FC236}">
+                <a16:creationId xmlns:a16="http://schemas.microsoft.com/office/drawing/2014/main" id="{2DD7E0CB-A18B-1D49-A394-5C12A9388DC7}"/>
+              </a:ext>
+            </a:extLst>
+          </p:cNvPr>
+          <p:cNvGrpSpPr/>
+          <p:nvPr/>
+        </p:nvGrpSpPr>
+        <p:grpSpPr>
+          <a:xfrm>
+            <a:off x="6152779" y="1947409"/>
+            <a:ext cx="1540794" cy="714704"/>
+            <a:chOff x="1303283" y="1008993"/>
+            <a:chExt cx="1807779" cy="714704"/>
+          </a:xfrm>
+        </p:grpSpPr>
+        <p:sp>
+          <p:nvSpPr>
+            <p:cNvPr id="20" name="Rectangle 19">
+              <a:extLst>
+                <a:ext uri="{FF2B5EF4-FFF2-40B4-BE49-F238E27FC236}">
+                  <a16:creationId xmlns:a16="http://schemas.microsoft.com/office/drawing/2014/main" id="{1D95AA71-A3A7-D14D-9676-4B71C2B86E34}"/>
+                </a:ext>
+              </a:extLst>
+            </p:cNvPr>
+            <p:cNvSpPr/>
+            <p:nvPr/>
+          </p:nvSpPr>
+          <p:spPr>
+            <a:xfrm>
+              <a:off x="1303283" y="1008993"/>
+              <a:ext cx="1807779" cy="714704"/>
+            </a:xfrm>
+            <a:prstGeom prst="rect">
+              <a:avLst/>
+            </a:prstGeom>
+            <a:noFill/>
+            <a:ln>
+              <a:solidFill>
+                <a:schemeClr val="tx1"/>
+              </a:solidFill>
+            </a:ln>
+          </p:spPr>
+          <p:style>
+            <a:lnRef idx="2">
+              <a:schemeClr val="accent1">
+                <a:shade val="50000"/>
+              </a:schemeClr>
+            </a:lnRef>
+            <a:fillRef idx="1">
+              <a:schemeClr val="accent1"/>
+            </a:fillRef>
+            <a:effectRef idx="0">
+              <a:schemeClr val="accent1"/>
+            </a:effectRef>
+            <a:fontRef idx="minor">
+              <a:schemeClr val="lt1"/>
+            </a:fontRef>
+          </p:style>
+          <p:txBody>
+            <a:bodyPr rtlCol="0" anchor="ctr"/>
+            <a:lstStyle/>
+            <a:p>
+              <a:pPr algn="ctr"/>
+              <a:endParaRPr lang="en-AU" sz="1200"/>
+            </a:p>
+          </p:txBody>
+        </p:sp>
+        <p:sp>
+          <p:nvSpPr>
+            <p:cNvPr id="21" name="TextBox 20">
+              <a:extLst>
+                <a:ext uri="{FF2B5EF4-FFF2-40B4-BE49-F238E27FC236}">
+                  <a16:creationId xmlns:a16="http://schemas.microsoft.com/office/drawing/2014/main" id="{A40D0C61-1BBF-3448-94D6-1C4CF96879D7}"/>
+                </a:ext>
+              </a:extLst>
+            </p:cNvPr>
+            <p:cNvSpPr txBox="1"/>
+            <p:nvPr/>
+          </p:nvSpPr>
+          <p:spPr>
+            <a:xfrm>
+              <a:off x="1950274" y="1230839"/>
+              <a:ext cx="513795" cy="276999"/>
+            </a:xfrm>
+            <a:prstGeom prst="rect">
+              <a:avLst/>
+            </a:prstGeom>
+            <a:noFill/>
+          </p:spPr>
+          <p:txBody>
+            <a:bodyPr wrap="none" rtlCol="0">
+              <a:spAutoFit/>
+            </a:bodyPr>
+            <a:lstStyle/>
+            <a:p>
+              <a:pPr algn="ctr"/>
+              <a:r>
+                <a:rPr lang="en-AU" sz="1200" dirty="0"/>
+                <a:t>HTTP</a:t>
+              </a:r>
+            </a:p>
+          </p:txBody>
+        </p:sp>
+      </p:grpSp>
+      <p:grpSp>
+        <p:nvGrpSpPr>
+          <p:cNvPr id="24" name="Group 23">
+            <a:extLst>
+              <a:ext uri="{FF2B5EF4-FFF2-40B4-BE49-F238E27FC236}">
+                <a16:creationId xmlns:a16="http://schemas.microsoft.com/office/drawing/2014/main" id="{526BF9D7-0268-5F47-A643-8F092585B60D}"/>
+              </a:ext>
+            </a:extLst>
+          </p:cNvPr>
+          <p:cNvGrpSpPr/>
+          <p:nvPr/>
+        </p:nvGrpSpPr>
+        <p:grpSpPr>
+          <a:xfrm>
+            <a:off x="4640318" y="2888083"/>
+            <a:ext cx="3053255" cy="714704"/>
+            <a:chOff x="1303283" y="1008993"/>
+            <a:chExt cx="1807779" cy="714704"/>
+          </a:xfrm>
+        </p:grpSpPr>
+        <p:sp>
+          <p:nvSpPr>
+            <p:cNvPr id="25" name="Rectangle 24">
+              <a:extLst>
+                <a:ext uri="{FF2B5EF4-FFF2-40B4-BE49-F238E27FC236}">
+                  <a16:creationId xmlns:a16="http://schemas.microsoft.com/office/drawing/2014/main" id="{87E6BB8E-97B3-2B45-8152-B0507CF36B0B}"/>
+                </a:ext>
+              </a:extLst>
+            </p:cNvPr>
+            <p:cNvSpPr/>
+            <p:nvPr/>
+          </p:nvSpPr>
+          <p:spPr>
+            <a:xfrm>
+              <a:off x="1303283" y="1008993"/>
+              <a:ext cx="1807779" cy="714704"/>
+            </a:xfrm>
+            <a:prstGeom prst="rect">
+              <a:avLst/>
+            </a:prstGeom>
+            <a:noFill/>
+            <a:ln>
+              <a:solidFill>
+                <a:schemeClr val="tx1"/>
+              </a:solidFill>
+            </a:ln>
+          </p:spPr>
+          <p:style>
+            <a:lnRef idx="2">
+              <a:schemeClr val="accent1">
+                <a:shade val="50000"/>
+              </a:schemeClr>
+            </a:lnRef>
+            <a:fillRef idx="1">
+              <a:schemeClr val="accent1"/>
+            </a:fillRef>
+            <a:effectRef idx="0">
+              <a:schemeClr val="accent1"/>
+            </a:effectRef>
+            <a:fontRef idx="minor">
+              <a:schemeClr val="lt1"/>
+            </a:fontRef>
+          </p:style>
+          <p:txBody>
+            <a:bodyPr rtlCol="0" anchor="ctr"/>
+            <a:lstStyle/>
+            <a:p>
+              <a:pPr algn="ctr"/>
+              <a:endParaRPr lang="en-AU" sz="1200"/>
+            </a:p>
+          </p:txBody>
+        </p:sp>
+        <p:sp>
+          <p:nvSpPr>
+            <p:cNvPr id="26" name="TextBox 25">
+              <a:extLst>
+                <a:ext uri="{FF2B5EF4-FFF2-40B4-BE49-F238E27FC236}">
+                  <a16:creationId xmlns:a16="http://schemas.microsoft.com/office/drawing/2014/main" id="{6BE19BC5-6F55-AC47-B76F-E6F92D2FD441}"/>
+                </a:ext>
+              </a:extLst>
+            </p:cNvPr>
+            <p:cNvSpPr txBox="1"/>
+            <p:nvPr/>
+          </p:nvSpPr>
+          <p:spPr>
+            <a:xfrm>
+              <a:off x="1952935" y="1181679"/>
+              <a:ext cx="508473" cy="276999"/>
+            </a:xfrm>
+            <a:prstGeom prst="rect">
+              <a:avLst/>
+            </a:prstGeom>
+            <a:noFill/>
+          </p:spPr>
+          <p:txBody>
+            <a:bodyPr wrap="none" rtlCol="0">
+              <a:spAutoFit/>
+            </a:bodyPr>
+            <a:lstStyle/>
+            <a:p>
+              <a:pPr algn="ctr"/>
+              <a:r>
+                <a:rPr lang="en-AU" sz="1200" dirty="0"/>
+                <a:t>QUIC</a:t>
+              </a:r>
+            </a:p>
+          </p:txBody>
+        </p:sp>
+      </p:grpSp>
+      <p:sp>
+        <p:nvSpPr>
+          <p:cNvPr id="28" name="Rectangle 27">
+            <a:extLst>
+              <a:ext uri="{FF2B5EF4-FFF2-40B4-BE49-F238E27FC236}">
+                <a16:creationId xmlns:a16="http://schemas.microsoft.com/office/drawing/2014/main" id="{D8582D08-2D5A-D54E-8938-A8A10090E75B}"/>
+              </a:ext>
+            </a:extLst>
+          </p:cNvPr>
+          <p:cNvSpPr/>
+          <p:nvPr/>
+        </p:nvSpPr>
+        <p:spPr>
+          <a:xfrm>
+            <a:off x="4640318" y="1947409"/>
+            <a:ext cx="1345446" cy="714704"/>
+          </a:xfrm>
+          <a:prstGeom prst="rect">
+            <a:avLst/>
+          </a:prstGeom>
+          <a:noFill/>
+          <a:ln>
+            <a:solidFill>
+              <a:schemeClr val="tx1"/>
+            </a:solidFill>
+          </a:ln>
+        </p:spPr>
+        <p:style>
+          <a:lnRef idx="2">
+            <a:schemeClr val="accent1">
+              <a:shade val="50000"/>
+            </a:schemeClr>
+          </a:lnRef>
+          <a:fillRef idx="1">
+            <a:schemeClr val="accent1"/>
+          </a:fillRef>
+          <a:effectRef idx="0">
+            <a:schemeClr val="accent1"/>
+          </a:effectRef>
+          <a:fontRef idx="minor">
+            <a:schemeClr val="lt1"/>
+          </a:fontRef>
+        </p:style>
+        <p:txBody>
+          <a:bodyPr rtlCol="0" anchor="ctr"/>
+          <a:lstStyle/>
+          <a:p>
+            <a:pPr algn="ctr"/>
+            <a:endParaRPr lang="en-AU" sz="1200"/>
+          </a:p>
+        </p:txBody>
+      </p:sp>
+      <p:sp>
+        <p:nvSpPr>
+          <p:cNvPr id="29" name="TextBox 28">
+            <a:extLst>
+              <a:ext uri="{FF2B5EF4-FFF2-40B4-BE49-F238E27FC236}">
+                <a16:creationId xmlns:a16="http://schemas.microsoft.com/office/drawing/2014/main" id="{AB694BCB-AF7A-6342-82BC-83796621EE13}"/>
+              </a:ext>
+            </a:extLst>
+          </p:cNvPr>
+          <p:cNvSpPr txBox="1"/>
+          <p:nvPr/>
+        </p:nvSpPr>
+        <p:spPr>
+          <a:xfrm>
+            <a:off x="4754298" y="2168575"/>
+            <a:ext cx="1117486" cy="276999"/>
+          </a:xfrm>
+          <a:prstGeom prst="rect">
+            <a:avLst/>
+          </a:prstGeom>
+          <a:noFill/>
+        </p:spPr>
+        <p:txBody>
+          <a:bodyPr wrap="none" rtlCol="0">
+            <a:spAutoFit/>
+          </a:bodyPr>
+          <a:lstStyle/>
+          <a:p>
+            <a:pPr algn="ctr"/>
+            <a:r>
+              <a:rPr lang="en-AU" sz="1200" dirty="0"/>
+              <a:t>TLS Handshake</a:t>
+            </a:r>
+          </a:p>
+        </p:txBody>
+      </p:sp>
+      <p:cxnSp>
+        <p:nvCxnSpPr>
+          <p:cNvPr id="31" name="Straight Arrow Connector 30">
+            <a:extLst>
+              <a:ext uri="{FF2B5EF4-FFF2-40B4-BE49-F238E27FC236}">
+                <a16:creationId xmlns:a16="http://schemas.microsoft.com/office/drawing/2014/main" id="{1CF0F33D-2D70-864D-81CC-0E9AC3F5AF74}"/>
+              </a:ext>
+            </a:extLst>
+          </p:cNvPr>
+          <p:cNvCxnSpPr/>
+          <p:nvPr/>
+        </p:nvCxnSpPr>
+        <p:spPr>
+          <a:xfrm>
+            <a:off x="2932386" y="1723697"/>
+            <a:ext cx="0" cy="550321"/>
+          </a:xfrm>
+          <a:prstGeom prst="straightConnector1">
+            <a:avLst/>
+          </a:prstGeom>
+          <a:ln>
+            <a:solidFill>
+              <a:schemeClr val="tx1"/>
+            </a:solidFill>
+            <a:tailEnd type="triangle"/>
+          </a:ln>
+        </p:spPr>
+        <p:style>
+          <a:lnRef idx="1">
+            <a:schemeClr val="accent1"/>
+          </a:lnRef>
+          <a:fillRef idx="0">
+            <a:schemeClr val="accent1"/>
+          </a:fillRef>
+          <a:effectRef idx="0">
+            <a:schemeClr val="accent1"/>
+          </a:effectRef>
+          <a:fontRef idx="minor">
+            <a:schemeClr val="tx1"/>
+          </a:fontRef>
+        </p:style>
+      </p:cxnSp>
+      <p:cxnSp>
+        <p:nvCxnSpPr>
+          <p:cNvPr id="32" name="Straight Arrow Connector 31">
+            <a:extLst>
+              <a:ext uri="{FF2B5EF4-FFF2-40B4-BE49-F238E27FC236}">
+                <a16:creationId xmlns:a16="http://schemas.microsoft.com/office/drawing/2014/main" id="{1F36A688-1E9A-324C-8CEA-EF5A9F39444E}"/>
+              </a:ext>
+            </a:extLst>
+          </p:cNvPr>
+          <p:cNvCxnSpPr>
+            <a:cxnSpLocks/>
+          </p:cNvCxnSpPr>
+          <p:nvPr/>
+        </p:nvCxnSpPr>
+        <p:spPr>
+          <a:xfrm>
+            <a:off x="1945019" y="1723697"/>
+            <a:ext cx="0" cy="192969"/>
+          </a:xfrm>
+          <a:prstGeom prst="straightConnector1">
+            <a:avLst/>
+          </a:prstGeom>
+          <a:ln>
+            <a:solidFill>
+              <a:schemeClr val="tx1"/>
+            </a:solidFill>
+            <a:tailEnd type="triangle"/>
+          </a:ln>
+        </p:spPr>
+        <p:style>
+          <a:lnRef idx="1">
+            <a:schemeClr val="accent1"/>
+          </a:lnRef>
+          <a:fillRef idx="0">
+            <a:schemeClr val="accent1"/>
+          </a:fillRef>
+          <a:effectRef idx="0">
+            <a:schemeClr val="accent1"/>
+          </a:effectRef>
+          <a:fontRef idx="minor">
+            <a:schemeClr val="tx1"/>
+          </a:fontRef>
+        </p:style>
+      </p:cxnSp>
+      <p:cxnSp>
+        <p:nvCxnSpPr>
+          <p:cNvPr id="34" name="Straight Arrow Connector 33">
+            <a:extLst>
+              <a:ext uri="{FF2B5EF4-FFF2-40B4-BE49-F238E27FC236}">
+                <a16:creationId xmlns:a16="http://schemas.microsoft.com/office/drawing/2014/main" id="{5E534A46-D4AC-D440-9FD7-44F7BA6D9523}"/>
+              </a:ext>
+            </a:extLst>
+          </p:cNvPr>
+          <p:cNvCxnSpPr>
+            <a:cxnSpLocks/>
+            <a:stCxn id="6" idx="2"/>
+            <a:endCxn id="9" idx="0"/>
+          </p:cNvCxnSpPr>
+          <p:nvPr/>
+        </p:nvCxnSpPr>
+        <p:spPr>
+          <a:xfrm flipH="1">
+            <a:off x="2192425" y="2643350"/>
+            <a:ext cx="3900" cy="225970"/>
+          </a:xfrm>
+          <a:prstGeom prst="straightConnector1">
+            <a:avLst/>
+          </a:prstGeom>
+          <a:ln>
+            <a:solidFill>
+              <a:schemeClr val="tx1"/>
+            </a:solidFill>
+            <a:tailEnd type="triangle"/>
+          </a:ln>
+        </p:spPr>
+        <p:style>
+          <a:lnRef idx="1">
+            <a:schemeClr val="accent1"/>
+          </a:lnRef>
+          <a:fillRef idx="0">
+            <a:schemeClr val="accent1"/>
+          </a:fillRef>
+          <a:effectRef idx="0">
+            <a:schemeClr val="accent1"/>
+          </a:effectRef>
+          <a:fontRef idx="minor">
+            <a:schemeClr val="tx1"/>
+          </a:fontRef>
+        </p:style>
+      </p:cxnSp>
+      <p:cxnSp>
+        <p:nvCxnSpPr>
+          <p:cNvPr id="37" name="Straight Arrow Connector 36">
+            <a:extLst>
+              <a:ext uri="{FF2B5EF4-FFF2-40B4-BE49-F238E27FC236}">
+                <a16:creationId xmlns:a16="http://schemas.microsoft.com/office/drawing/2014/main" id="{D823DCB1-E3C2-7245-8828-E4CD839F7039}"/>
+              </a:ext>
+            </a:extLst>
+          </p:cNvPr>
+          <p:cNvCxnSpPr>
+            <a:cxnSpLocks/>
+          </p:cNvCxnSpPr>
+          <p:nvPr/>
+        </p:nvCxnSpPr>
+        <p:spPr>
+          <a:xfrm>
+            <a:off x="5313041" y="2657309"/>
+            <a:ext cx="1016" cy="225970"/>
+          </a:xfrm>
+          <a:prstGeom prst="straightConnector1">
+            <a:avLst/>
+          </a:prstGeom>
+          <a:ln>
+            <a:solidFill>
+              <a:schemeClr val="tx1"/>
+            </a:solidFill>
+            <a:tailEnd type="triangle"/>
+          </a:ln>
+        </p:spPr>
+        <p:style>
+          <a:lnRef idx="1">
+            <a:schemeClr val="accent1"/>
+          </a:lnRef>
+          <a:fillRef idx="0">
+            <a:schemeClr val="accent1"/>
+          </a:fillRef>
+          <a:effectRef idx="0">
+            <a:schemeClr val="accent1"/>
+          </a:effectRef>
+          <a:fontRef idx="minor">
+            <a:schemeClr val="tx1"/>
+          </a:fontRef>
+        </p:style>
+      </p:cxnSp>
+      <p:cxnSp>
+        <p:nvCxnSpPr>
+          <p:cNvPr id="38" name="Straight Arrow Connector 37">
+            <a:extLst>
+              <a:ext uri="{FF2B5EF4-FFF2-40B4-BE49-F238E27FC236}">
+                <a16:creationId xmlns:a16="http://schemas.microsoft.com/office/drawing/2014/main" id="{E96673BF-EFB3-F74F-A3E9-212C097C11D9}"/>
+              </a:ext>
+            </a:extLst>
+          </p:cNvPr>
+          <p:cNvCxnSpPr>
+            <a:cxnSpLocks/>
+          </p:cNvCxnSpPr>
+          <p:nvPr/>
+        </p:nvCxnSpPr>
+        <p:spPr>
+          <a:xfrm>
+            <a:off x="6922159" y="2657309"/>
+            <a:ext cx="1016" cy="225970"/>
+          </a:xfrm>
+          <a:prstGeom prst="straightConnector1">
+            <a:avLst/>
+          </a:prstGeom>
+          <a:ln>
+            <a:solidFill>
+              <a:schemeClr val="tx1"/>
+            </a:solidFill>
+            <a:tailEnd type="triangle"/>
+          </a:ln>
+        </p:spPr>
+        <p:style>
+          <a:lnRef idx="1">
+            <a:schemeClr val="accent1"/>
+          </a:lnRef>
+          <a:fillRef idx="0">
+            <a:schemeClr val="accent1"/>
+          </a:fillRef>
+          <a:effectRef idx="0">
+            <a:schemeClr val="accent1"/>
+          </a:effectRef>
+          <a:fontRef idx="minor">
+            <a:schemeClr val="tx1"/>
+          </a:fontRef>
+        </p:style>
+      </p:cxnSp>
+      <p:sp>
+        <p:nvSpPr>
+          <p:cNvPr id="39" name="TextBox 38">
+            <a:extLst>
+              <a:ext uri="{FF2B5EF4-FFF2-40B4-BE49-F238E27FC236}">
+                <a16:creationId xmlns:a16="http://schemas.microsoft.com/office/drawing/2014/main" id="{94AE1623-3A30-F646-80A5-B321249C3CED}"/>
+              </a:ext>
+            </a:extLst>
+          </p:cNvPr>
+          <p:cNvSpPr txBox="1"/>
+          <p:nvPr/>
+        </p:nvSpPr>
+        <p:spPr>
+          <a:xfrm>
+            <a:off x="5904115" y="3828757"/>
+            <a:ext cx="357790" cy="276999"/>
+          </a:xfrm>
+          <a:prstGeom prst="rect">
+            <a:avLst/>
+          </a:prstGeom>
+          <a:noFill/>
+        </p:spPr>
+        <p:txBody>
+          <a:bodyPr wrap="none" rtlCol="0">
+            <a:spAutoFit/>
+          </a:bodyPr>
+          <a:lstStyle/>
+          <a:p>
+            <a:r>
+              <a:rPr lang="en-AU" sz="1200" dirty="0"/>
+              <a:t>(b)</a:t>
+            </a:r>
+          </a:p>
+        </p:txBody>
+      </p:sp>
+      <p:sp>
+        <p:nvSpPr>
+          <p:cNvPr id="40" name="TextBox 39">
+            <a:extLst>
+              <a:ext uri="{FF2B5EF4-FFF2-40B4-BE49-F238E27FC236}">
+                <a16:creationId xmlns:a16="http://schemas.microsoft.com/office/drawing/2014/main" id="{3A3C2147-32C8-DA43-857F-0E91266BDFC9}"/>
+              </a:ext>
+            </a:extLst>
+          </p:cNvPr>
+          <p:cNvSpPr txBox="1"/>
+          <p:nvPr/>
+        </p:nvSpPr>
+        <p:spPr>
+          <a:xfrm>
+            <a:off x="1983039" y="3809994"/>
+            <a:ext cx="351378" cy="276999"/>
+          </a:xfrm>
+          <a:prstGeom prst="rect">
+            <a:avLst/>
+          </a:prstGeom>
+          <a:noFill/>
+        </p:spPr>
+        <p:txBody>
+          <a:bodyPr wrap="none" rtlCol="0">
+            <a:spAutoFit/>
+          </a:bodyPr>
+          <a:lstStyle/>
+          <a:p>
+            <a:r>
+              <a:rPr lang="en-AU" sz="1200" dirty="0"/>
+              <a:t>(a)</a:t>
+            </a:r>
+          </a:p>
+        </p:txBody>
+      </p:sp>
+    </p:spTree>
+    <p:extLst>
+      <p:ext uri="{BB962C8B-B14F-4D97-AF65-F5344CB8AC3E}">
+        <p14:creationId xmlns:p14="http://schemas.microsoft.com/office/powerpoint/2010/main" val="1893350413"/>
       </p:ext>
     </p:extLst>
   </p:cSld>

</xml_diff>